<commit_message>
fixed spelling errors on poster
</commit_message>
<xml_diff>
--- a/documentation/csci_poster.pptx
+++ b/documentation/csci_poster.pptx
@@ -274,7 +274,7 @@
           <a:p>
             <a:fld id="{64ED9595-0AE4-4B15-B393-D0F1DD0EB94B}" type="datetimeFigureOut">
               <a:rPr lang="en-US" smtClean="0"/>
-              <a:t>4/7/2022</a:t>
+              <a:t>4/12/2022</a:t>
             </a:fld>
             <a:endParaRPr lang="en-US"/>
           </a:p>
@@ -761,7 +761,7 @@
           <a:p>
             <a:fld id="{41C03D7F-B796-4B92-B0C7-6D4C9CC8C787}" type="datetimeFigureOut">
               <a:rPr lang="en-US" smtClean="0"/>
-              <a:t>4/7/2022</a:t>
+              <a:t>4/12/2022</a:t>
             </a:fld>
             <a:endParaRPr lang="en-US"/>
           </a:p>
@@ -931,7 +931,7 @@
           <a:p>
             <a:fld id="{41C03D7F-B796-4B92-B0C7-6D4C9CC8C787}" type="datetimeFigureOut">
               <a:rPr lang="en-US" smtClean="0"/>
-              <a:t>4/7/2022</a:t>
+              <a:t>4/12/2022</a:t>
             </a:fld>
             <a:endParaRPr lang="en-US"/>
           </a:p>
@@ -1111,7 +1111,7 @@
           <a:p>
             <a:fld id="{41C03D7F-B796-4B92-B0C7-6D4C9CC8C787}" type="datetimeFigureOut">
               <a:rPr lang="en-US" smtClean="0"/>
-              <a:t>4/7/2022</a:t>
+              <a:t>4/12/2022</a:t>
             </a:fld>
             <a:endParaRPr lang="en-US"/>
           </a:p>
@@ -1281,7 +1281,7 @@
           <a:p>
             <a:fld id="{41C03D7F-B796-4B92-B0C7-6D4C9CC8C787}" type="datetimeFigureOut">
               <a:rPr lang="en-US" smtClean="0"/>
-              <a:t>4/7/2022</a:t>
+              <a:t>4/12/2022</a:t>
             </a:fld>
             <a:endParaRPr lang="en-US"/>
           </a:p>
@@ -1525,7 +1525,7 @@
           <a:p>
             <a:fld id="{41C03D7F-B796-4B92-B0C7-6D4C9CC8C787}" type="datetimeFigureOut">
               <a:rPr lang="en-US" smtClean="0"/>
-              <a:t>4/7/2022</a:t>
+              <a:t>4/12/2022</a:t>
             </a:fld>
             <a:endParaRPr lang="en-US"/>
           </a:p>
@@ -1757,7 +1757,7 @@
           <a:p>
             <a:fld id="{41C03D7F-B796-4B92-B0C7-6D4C9CC8C787}" type="datetimeFigureOut">
               <a:rPr lang="en-US" smtClean="0"/>
-              <a:t>4/7/2022</a:t>
+              <a:t>4/12/2022</a:t>
             </a:fld>
             <a:endParaRPr lang="en-US"/>
           </a:p>
@@ -2124,7 +2124,7 @@
           <a:p>
             <a:fld id="{41C03D7F-B796-4B92-B0C7-6D4C9CC8C787}" type="datetimeFigureOut">
               <a:rPr lang="en-US" smtClean="0"/>
-              <a:t>4/7/2022</a:t>
+              <a:t>4/12/2022</a:t>
             </a:fld>
             <a:endParaRPr lang="en-US"/>
           </a:p>
@@ -2242,7 +2242,7 @@
           <a:p>
             <a:fld id="{41C03D7F-B796-4B92-B0C7-6D4C9CC8C787}" type="datetimeFigureOut">
               <a:rPr lang="en-US" smtClean="0"/>
-              <a:t>4/7/2022</a:t>
+              <a:t>4/12/2022</a:t>
             </a:fld>
             <a:endParaRPr lang="en-US"/>
           </a:p>
@@ -2337,7 +2337,7 @@
           <a:p>
             <a:fld id="{41C03D7F-B796-4B92-B0C7-6D4C9CC8C787}" type="datetimeFigureOut">
               <a:rPr lang="en-US" smtClean="0"/>
-              <a:t>4/7/2022</a:t>
+              <a:t>4/12/2022</a:t>
             </a:fld>
             <a:endParaRPr lang="en-US"/>
           </a:p>
@@ -2614,7 +2614,7 @@
           <a:p>
             <a:fld id="{41C03D7F-B796-4B92-B0C7-6D4C9CC8C787}" type="datetimeFigureOut">
               <a:rPr lang="en-US" smtClean="0"/>
-              <a:t>4/7/2022</a:t>
+              <a:t>4/12/2022</a:t>
             </a:fld>
             <a:endParaRPr lang="en-US"/>
           </a:p>
@@ -2871,7 +2871,7 @@
           <a:p>
             <a:fld id="{41C03D7F-B796-4B92-B0C7-6D4C9CC8C787}" type="datetimeFigureOut">
               <a:rPr lang="en-US" smtClean="0"/>
-              <a:t>4/7/2022</a:t>
+              <a:t>4/12/2022</a:t>
             </a:fld>
             <a:endParaRPr lang="en-US"/>
           </a:p>
@@ -3084,7 +3084,7 @@
           <a:p>
             <a:fld id="{41C03D7F-B796-4B92-B0C7-6D4C9CC8C787}" type="datetimeFigureOut">
               <a:rPr lang="en-US" smtClean="0"/>
-              <a:t>4/7/2022</a:t>
+              <a:t>4/12/2022</a:t>
             </a:fld>
             <a:endParaRPr lang="en-US"/>
           </a:p>
@@ -3543,7 +3543,7 @@
                 </a:solidFill>
                 <a:effectLst/>
               </a:rPr>
-              <a:t>Our proposal is for a web based application called The Palette Picker. The Palette Picker will allow users to create personalized five color sets, and then share those patterns with friends and the community. These palettes can be referenced when creating pottery, painting your home, using a digital art program, or other activities that utilize color and require a cohesive look or </a:t>
+              <a:t>Our proposal is for a web-based application called The Palette Picker. The Palette Picker will allow users to create personalized five color sets, and then share those patterns with friends and the community. These palettes can be referenced when creating pottery, painting your home, using a digital art program, or other activities that utilize color and require a cohesive look or </a:t>
             </a:r>
             <a:r>
               <a:rPr lang="en-US" sz="3200" dirty="0">
@@ -4013,7 +4013,7 @@
             </a:r>
             <a:r>
               <a:rPr lang="en-US" sz="3200" dirty="0"/>
-              <a:t> makes sure the password is encrypted before reaching the database, or searching the database. The login component also connects to the profile component once the user's login credentials have been confirmed. The search palettes component searches the database for relevant palettes from the users search parameters. The profile component has a provided </a:t>
+              <a:t> makes sure the password is encrypted before reaching the database or searching the database. The login component also connects to the profile component once the user's login credentials have been confirmed. The search palettes component searches the database for relevant palettes from the users search parameters. The profile component has a provided </a:t>
             </a:r>
             <a:r>
               <a:rPr lang="en-US" sz="3200" dirty="0" err="1"/>
@@ -4032,7 +4032,7 @@
             <a:pPr algn="just"/>
             <a:r>
               <a:rPr lang="en-US" sz="3200" dirty="0"/>
-              <a:t>The database (ERD shown in Figure 2) will include four tables: a User table, a Palette table, a </a:t>
+              <a:t>The database (ERD shown in Figure 2) includes four tables: a User table, a Palette table, a </a:t>
             </a:r>
             <a:r>
               <a:rPr lang="en-US" sz="3200" dirty="0" err="1"/>
@@ -4048,7 +4048,7 @@
             </a:r>
             <a:r>
               <a:rPr lang="en-US" sz="3200" dirty="0"/>
-              <a:t> table. The User table will have 3 classes: an ID as the primary key, a username, and a password. The Palette table has ten classes: an integer ID as a primary key, an integer user id that is a foreign key, a title, 6 hex codes representing each color in the palette, a date representing the day the palette was created, and the number of times a person has clicked the palette’s page. The </a:t>
+              <a:t> table. The User table has 3 classes: an ID as the primary key, a username, and a password. The Palette table has ten classes: an integer ID as a primary key, an integer user id that is a foreign key, a title, 6 hex codes representing each color in the palette, a date representing the day the palette was created, and the number of times a person has clicked the palette’s page. The </a:t>
             </a:r>
             <a:r>
               <a:rPr lang="en-US" sz="3200" dirty="0" err="1"/>
@@ -4180,7 +4180,7 @@
             <a:pPr algn="just"/>
             <a:r>
               <a:rPr lang="en-US" sz="3200" dirty="0"/>
-              <a:t>There are also some features we would like to add, but will not have the opportunity to implement. One feature would create a second palette of colors that compliment the first. For example, by uploading an image of a room, a user could learn what color items or furniture would work well with the room. Another feature would allow users to download a PNG of a palette, including the hex codes of the colors. While this could be nice, users could already snip a palette, making it of minor importance in comparison.</a:t>
+              <a:t>There are also some features we would like to add but will not have the opportunity to implement. One feature would create a second palette of colors that compliment the first. For example, by uploading an image of a room, a user could learn what color items or furniture would work well with the room. Another feature would allow users to download a PNG of a palette, including the hex codes of the colors. While this could be nice, users could already snip a palette, making it of minor importance in comparison.</a:t>
             </a:r>
             <a:endParaRPr lang="en-US" sz="3200" b="1" dirty="0"/>
           </a:p>
@@ -4386,7 +4386,7 @@
                 </a:solidFill>
                 <a:effectLst/>
               </a:rPr>
-              <a:t>If we have time to implement it, users will also be able to create palettes through a color search feature. This will allow the user to pick a base color, such as “blue” or “green” from a dropdown menu. Then, the user will be prompted to pick the specific shade of that color that they are looking for. Once they have selected a base color, 4 complementary colors will be generated using an algorithm. If the user would prefer to pick their own shades there will be an option to create custom colors. </a:t>
+              <a:t>If we have time to implement it, users will also be able to create palettes through a color search feature. This will allow the user to pick a base color, such as “blue” or “green” from a dropdown menu. Then, the user will be prompted to pick the specific shade of that color that they are looking for. Once they have selected a base color, 4 complementary colors will be generated using an algorithm. If the user would prefer to pick their own shades, there will be an option to create custom colors. </a:t>
             </a:r>
             <a:endParaRPr lang="en-US" sz="3200" b="0" dirty="0">
               <a:effectLst/>
@@ -4408,7 +4408,25 @@
                 </a:solidFill>
                 <a:effectLst/>
               </a:rPr>
-              <a:t>On the social side of the site users will be allowed to share their color palettes with friends and the community. The community page will allow users to find color palettes created by other users of the Palette Picker community. When users save a palette it will automatically post to their profile, and be available through the community page. If users do not wish to share their post with the community there will be a privacy setting, in which you can disable posting to the community page, disable posting to your profile, and disable other users from viewing your profile. Users will also have the option of sharing palettes with friends. If time permits, uploading palettes, saving palettes, adding friends, and a few other of these features will be limited to users that have created an account on the site.</a:t>
+              <a:t>On the social side of the site users will be allowed to share their color palettes with friends and the community. The community page will allow users to find color palettes created by other users of the Palette Picker community. When users save </a:t>
+            </a:r>
+            <a:r>
+              <a:rPr lang="en-US" sz="3200" b="0" i="0" u="none" strike="noStrike">
+                <a:solidFill>
+                  <a:srgbClr val="000000"/>
+                </a:solidFill>
+                <a:effectLst/>
+              </a:rPr>
+              <a:t>a palette, </a:t>
+            </a:r>
+            <a:r>
+              <a:rPr lang="en-US" sz="3200" b="0" i="0" u="none" strike="noStrike" dirty="0">
+                <a:solidFill>
+                  <a:srgbClr val="000000"/>
+                </a:solidFill>
+                <a:effectLst/>
+              </a:rPr>
+              <a:t>it will automatically post to their profile, and be available through the community page. If users do not wish to share their post with the community there will be a privacy setting, in which you can disable posting to the community page, disable posting to your profile, and disable other users from viewing your profile. Users will also have the option of sharing palettes with friends. If time permits, uploading palettes, saving palettes, adding friends, and a few other of these features will be limited to users that have created an account on the site.</a:t>
             </a:r>
             <a:endParaRPr lang="en-US" sz="3200" dirty="0"/>
           </a:p>

</xml_diff>

<commit_message>
added to design column of poster
</commit_message>
<xml_diff>
--- a/documentation/csci_poster.pptx
+++ b/documentation/csci_poster.pptx
@@ -3969,7 +3969,7 @@
         <p:spPr>
           <a:xfrm>
             <a:off x="20116800" y="7315200"/>
-            <a:ext cx="7543800" cy="25699343"/>
+            <a:ext cx="7543800" cy="28653998"/>
           </a:xfrm>
           <a:prstGeom prst="rect">
             <a:avLst/>
@@ -3998,7 +3998,18 @@
             <a:pPr algn="just"/>
             <a:r>
               <a:rPr lang="en-US" sz="3200" dirty="0"/>
-              <a:t> The Palette Picker component diagram (Figure 1) illustrates how our components interact with each other starting with the UI. The UI has two required interfaces, which are the Credentials interface and the </a:t>
+              <a:t>Our project uses JavaScript, PHP, and HTML. Since the primary functions of the application include creating and saving palettes, we also utilize MySQL for storing that information.</a:t>
+            </a:r>
+          </a:p>
+          <a:p>
+            <a:pPr algn="just"/>
+            <a:endParaRPr lang="en-US" sz="3200" dirty="0"/>
+          </a:p>
+          <a:p>
+            <a:pPr algn="just"/>
+            <a:r>
+              <a:rPr lang="en-US" sz="3200" dirty="0"/>
+              <a:t>The Palette Picker component diagram (Figure 1) illustrates how our components interact with each other starting with the UI. The UI has two required interfaces, which are the Credentials interface and the </a:t>
             </a:r>
             <a:r>
               <a:rPr lang="en-US" sz="3200" dirty="0" err="1"/>

</xml_diff>